<commit_message>
Python lb1\ АПЗ edited \ some projects setuped
</commit_message>
<xml_diff>
--- a/АПЗ/PZ/PZ1/Abstract factory.pptx
+++ b/АПЗ/PZ/PZ1/Abstract factory.pptx
@@ -5,17 +5,18 @@
     <p:sldMasterId id="2147483696" r:id="rId1"/>
   </p:sldMasterIdLst>
   <p:notesMasterIdLst>
-    <p:notesMasterId r:id="rId10"/>
+    <p:notesMasterId r:id="rId11"/>
   </p:notesMasterIdLst>
   <p:sldIdLst>
     <p:sldId id="256" r:id="rId2"/>
     <p:sldId id="257" r:id="rId3"/>
     <p:sldId id="262" r:id="rId4"/>
     <p:sldId id="263" r:id="rId5"/>
-    <p:sldId id="258" r:id="rId6"/>
-    <p:sldId id="259" r:id="rId7"/>
-    <p:sldId id="260" r:id="rId8"/>
-    <p:sldId id="261" r:id="rId9"/>
+    <p:sldId id="264" r:id="rId6"/>
+    <p:sldId id="265" r:id="rId7"/>
+    <p:sldId id="258" r:id="rId8"/>
+    <p:sldId id="259" r:id="rId9"/>
+    <p:sldId id="261" r:id="rId10"/>
   </p:sldIdLst>
   <p:sldSz cx="12192000" cy="6858000"/>
   <p:notesSz cx="6858000" cy="9144000"/>
@@ -204,7 +205,7 @@
           <a:p>
             <a:fld id="{615A7608-47A6-46C3-8FCD-CB993C3115C2}" type="datetimeFigureOut">
               <a:rPr lang="en-US" smtClean="0"/>
-              <a:t>2/21/2024</a:t>
+              <a:t>3/22/2024</a:t>
             </a:fld>
             <a:endParaRPr lang="en-US"/>
           </a:p>
@@ -641,7 +642,7 @@
           <a:p>
             <a:fld id="{A61FF5DC-AF08-4C87-A7F7-790D027B9251}" type="datetime1">
               <a:rPr lang="en-US" smtClean="0"/>
-              <a:t>2/21/2024</a:t>
+              <a:t>3/22/2024</a:t>
             </a:fld>
             <a:endParaRPr lang="en-US"/>
           </a:p>
@@ -908,7 +909,7 @@
           <a:p>
             <a:fld id="{1A7D581B-07B7-4F98-9C29-A94CAB7F32D3}" type="datetime1">
               <a:rPr lang="en-US" smtClean="0"/>
-              <a:t>2/21/2024</a:t>
+              <a:t>3/22/2024</a:t>
             </a:fld>
             <a:endParaRPr lang="en-US"/>
           </a:p>
@@ -1139,7 +1140,7 @@
           <a:p>
             <a:fld id="{0ED43D2F-866E-43A3-8055-E20A2B9850E4}" type="datetime1">
               <a:rPr lang="en-US" smtClean="0"/>
-              <a:t>2/21/2024</a:t>
+              <a:t>3/22/2024</a:t>
             </a:fld>
             <a:endParaRPr lang="en-US"/>
           </a:p>
@@ -1449,7 +1450,7 @@
           <a:p>
             <a:fld id="{09B0BEF7-EE1C-4D1B-86DD-E73CFFDF2620}" type="datetime1">
               <a:rPr lang="en-US" smtClean="0"/>
-              <a:t>2/21/2024</a:t>
+              <a:t>3/22/2024</a:t>
             </a:fld>
             <a:endParaRPr lang="en-US"/>
           </a:p>
@@ -1922,7 +1923,7 @@
           <a:p>
             <a:fld id="{321CDAB7-322E-4455-B3E2-89164939471C}" type="datetime1">
               <a:rPr lang="en-US" smtClean="0"/>
-              <a:t>2/21/2024</a:t>
+              <a:t>3/22/2024</a:t>
             </a:fld>
             <a:endParaRPr lang="en-US"/>
           </a:p>
@@ -2469,7 +2470,7 @@
           <a:p>
             <a:fld id="{8699227C-FC9E-4ECE-AAB4-EB62BFF44E5B}" type="datetime1">
               <a:rPr lang="en-US" smtClean="0"/>
-              <a:t>2/21/2024</a:t>
+              <a:t>3/22/2024</a:t>
             </a:fld>
             <a:endParaRPr lang="en-US"/>
           </a:p>
@@ -3243,7 +3244,7 @@
           <a:p>
             <a:fld id="{24B6FD80-8FAA-4F94-BCA8-958D2204891E}" type="datetime1">
               <a:rPr lang="en-US" smtClean="0"/>
-              <a:t>2/21/2024</a:t>
+              <a:t>3/22/2024</a:t>
             </a:fld>
             <a:endParaRPr lang="en-US"/>
           </a:p>
@@ -3418,7 +3419,7 @@
           <a:p>
             <a:fld id="{99FF6ABC-A63F-4ADE-8A34-C60DFAFC8048}" type="datetime1">
               <a:rPr lang="en-US" smtClean="0"/>
-              <a:t>2/21/2024</a:t>
+              <a:t>3/22/2024</a:t>
             </a:fld>
             <a:endParaRPr lang="en-US"/>
           </a:p>
@@ -3641,7 +3642,7 @@
           <a:p>
             <a:fld id="{413BC1FC-5278-4EFF-A4BD-3B51E77422BC}" type="datetime1">
               <a:rPr lang="en-US" smtClean="0"/>
-              <a:t>2/21/2024</a:t>
+              <a:t>3/22/2024</a:t>
             </a:fld>
             <a:endParaRPr lang="en-US"/>
           </a:p>
@@ -3821,7 +3822,7 @@
           <a:p>
             <a:fld id="{BB3D9242-666D-45DF-B425-AB13354F48D7}" type="datetime1">
               <a:rPr lang="en-US" smtClean="0"/>
-              <a:t>2/21/2024</a:t>
+              <a:t>3/22/2024</a:t>
             </a:fld>
             <a:endParaRPr lang="en-US"/>
           </a:p>
@@ -4110,7 +4111,7 @@
           <a:p>
             <a:fld id="{525C1076-2A52-48E4-ADFC-E7C568E136E1}" type="datetime1">
               <a:rPr lang="en-US" smtClean="0"/>
-              <a:t>2/21/2024</a:t>
+              <a:t>3/22/2024</a:t>
             </a:fld>
             <a:endParaRPr lang="en-US"/>
           </a:p>
@@ -4352,7 +4353,7 @@
           <a:p>
             <a:fld id="{5BA5B575-6079-4B28-A95A-4D2DD7E2A48D}" type="datetime1">
               <a:rPr lang="en-US" smtClean="0"/>
-              <a:t>2/21/2024</a:t>
+              <a:t>3/22/2024</a:t>
             </a:fld>
             <a:endParaRPr lang="en-US"/>
           </a:p>
@@ -4731,7 +4732,7 @@
           <a:p>
             <a:fld id="{DB8EF70C-7405-4E4E-9B8C-BC118307D9F5}" type="datetime1">
               <a:rPr lang="en-US" smtClean="0"/>
-              <a:t>2/21/2024</a:t>
+              <a:t>3/22/2024</a:t>
             </a:fld>
             <a:endParaRPr lang="en-US"/>
           </a:p>
@@ -4849,7 +4850,7 @@
           <a:p>
             <a:fld id="{443B6496-9482-4E44-9D17-3846D55AC05B}" type="datetime1">
               <a:rPr lang="en-US" smtClean="0"/>
-              <a:t>2/21/2024</a:t>
+              <a:t>3/22/2024</a:t>
             </a:fld>
             <a:endParaRPr lang="en-US"/>
           </a:p>
@@ -4944,7 +4945,7 @@
           <a:p>
             <a:fld id="{068BFB4B-D0E8-4F94-B915-7257FA6B522E}" type="datetime1">
               <a:rPr lang="en-US" smtClean="0"/>
-              <a:t>2/21/2024</a:t>
+              <a:t>3/22/2024</a:t>
             </a:fld>
             <a:endParaRPr lang="en-US"/>
           </a:p>
@@ -5193,7 +5194,7 @@
           <a:p>
             <a:fld id="{AD2E5A8A-2E0B-4B70-8757-22BA1621D485}" type="datetime1">
               <a:rPr lang="en-US" smtClean="0"/>
-              <a:t>2/21/2024</a:t>
+              <a:t>3/22/2024</a:t>
             </a:fld>
             <a:endParaRPr lang="en-US"/>
           </a:p>
@@ -5450,7 +5451,7 @@
           <a:p>
             <a:fld id="{2B868697-C1AF-4C64-B287-854D14FCE5B1}" type="datetime1">
               <a:rPr lang="en-US" smtClean="0"/>
-              <a:t>2/21/2024</a:t>
+              <a:t>3/22/2024</a:t>
             </a:fld>
             <a:endParaRPr lang="en-US"/>
           </a:p>
@@ -5693,7 +5694,7 @@
           <a:p>
             <a:fld id="{762E9048-3AC8-4DE3-A4B8-63A73D9D96E8}" type="datetime1">
               <a:rPr lang="en-US" smtClean="0"/>
-              <a:t>2/21/2024</a:t>
+              <a:t>3/22/2024</a:t>
             </a:fld>
             <a:endParaRPr lang="en-US"/>
           </a:p>
@@ -7089,14 +7090,6 @@
 <file path=ppt/slides/slide5.xml><?xml version="1.0" encoding="utf-8"?>
 <p:sld xmlns:a="http://schemas.openxmlformats.org/drawingml/2006/main" xmlns:r="http://schemas.openxmlformats.org/officeDocument/2006/relationships" xmlns:p="http://schemas.openxmlformats.org/presentationml/2006/main">
   <p:cSld>
-    <p:bg>
-      <p:bgPr>
-        <a:solidFill>
-          <a:schemeClr val="bg1"/>
-        </a:solidFill>
-        <a:effectLst/>
-      </p:bgPr>
-    </p:bg>
     <p:spTree>
       <p:nvGrpSpPr>
         <p:cNvPr id="1" name=""/>
@@ -7113,259 +7106,322 @@
       </p:grpSpPr>
       <p:sp>
         <p:nvSpPr>
-          <p:cNvPr id="11" name="Rectangle 10">
+          <p:cNvPr id="2" name="Title 1">
             <a:extLst>
               <a:ext uri="{FF2B5EF4-FFF2-40B4-BE49-F238E27FC236}">
-                <a16:creationId xmlns:a16="http://schemas.microsoft.com/office/drawing/2014/main" id="{5B015324-98EE-4370-8001-85C1278A18ED}"/>
-              </a:ext>
-              <a:ext uri="{C183D7F6-B498-43B3-948B-1728B52AA6E4}">
-                <adec:decorative xmlns:adec="http://schemas.microsoft.com/office/drawing/2017/decorative" val="1"/>
+                <a16:creationId xmlns:a16="http://schemas.microsoft.com/office/drawing/2014/main" id="{0F2F84FF-0B4E-9BF6-72EF-9A792143210B}"/>
               </a:ext>
             </a:extLst>
           </p:cNvPr>
           <p:cNvSpPr>
-            <a:spLocks noGrp="1" noRot="1" noChangeAspect="1" noMove="1" noResize="1" noEditPoints="1" noAdjustHandles="1" noChangeArrowheads="1" noChangeShapeType="1" noTextEdit="1"/>
-          </p:cNvSpPr>
-          <p:nvPr>
-            <p:extLst>
-              <p:ext uri="{386F3935-93C4-4BCD-93E2-E3B085C9AB24}">
-                <p16:designElem xmlns:p16="http://schemas.microsoft.com/office/powerpoint/2015/main" val="1"/>
-              </p:ext>
-            </p:extLst>
-          </p:nvPr>
-        </p:nvSpPr>
-        <p:spPr>
-          <a:xfrm>
-            <a:off x="0" y="0"/>
-            <a:ext cx="12192000" cy="6858000"/>
-          </a:xfrm>
-          <a:prstGeom prst="rect">
-            <a:avLst/>
-          </a:prstGeom>
-          <a:solidFill>
-            <a:schemeClr val="bg1"/>
-          </a:solidFill>
-          <a:ln>
-            <a:noFill/>
-          </a:ln>
-        </p:spPr>
-        <p:style>
-          <a:lnRef idx="2">
-            <a:schemeClr val="accent1">
-              <a:shade val="50000"/>
-            </a:schemeClr>
-          </a:lnRef>
-          <a:fillRef idx="1">
-            <a:schemeClr val="accent1"/>
-          </a:fillRef>
-          <a:effectRef idx="0">
-            <a:schemeClr val="accent1"/>
-          </a:effectRef>
-          <a:fontRef idx="minor">
-            <a:schemeClr val="lt1"/>
-          </a:fontRef>
-        </p:style>
-        <p:txBody>
-          <a:bodyPr rtlCol="0" anchor="ctr"/>
+            <a:spLocks noGrp="1"/>
+          </p:cNvSpPr>
+          <p:nvPr>
+            <p:ph type="title"/>
+          </p:nvPr>
+        </p:nvSpPr>
+        <p:spPr>
+          <a:xfrm>
+            <a:off x="2984500" y="218273"/>
+            <a:ext cx="8610600" cy="1293028"/>
+          </a:xfrm>
+        </p:spPr>
+        <p:txBody>
+          <a:bodyPr/>
           <a:lstStyle/>
           <a:p>
-            <a:pPr algn="ctr"/>
-            <a:endParaRPr lang="en-US"/>
-          </a:p>
-        </p:txBody>
-      </p:sp>
-      <p:pic>
-        <p:nvPicPr>
-          <p:cNvPr id="13" name="Picture 12">
+            <a:r>
+              <a:rPr lang="uk-UA" dirty="0"/>
+              <a:t>Порівняння</a:t>
+            </a:r>
+            <a:endParaRPr lang="en-US" dirty="0"/>
+          </a:p>
+        </p:txBody>
+      </p:sp>
+      <p:graphicFrame>
+        <p:nvGraphicFramePr>
+          <p:cNvPr id="5" name="Content Placeholder 4">
             <a:extLst>
               <a:ext uri="{FF2B5EF4-FFF2-40B4-BE49-F238E27FC236}">
-                <a16:creationId xmlns:a16="http://schemas.microsoft.com/office/drawing/2014/main" id="{14E49BFF-40A2-4616-8638-9CBE4EC1F6AA}"/>
-              </a:ext>
-              <a:ext uri="{C183D7F6-B498-43B3-948B-1728B52AA6E4}">
-                <adec:decorative xmlns:adec="http://schemas.microsoft.com/office/drawing/2017/decorative" val="1"/>
+                <a16:creationId xmlns:a16="http://schemas.microsoft.com/office/drawing/2014/main" id="{778B1557-F696-609C-992A-25EF85D67392}"/>
               </a:ext>
             </a:extLst>
           </p:cNvPr>
-          <p:cNvPicPr>
-            <a:picLocks noGrp="1" noRot="1" noChangeAspect="1" noMove="1" noResize="1" noEditPoints="1" noAdjustHandles="1" noChangeArrowheads="1" noChangeShapeType="1" noCrop="1"/>
-          </p:cNvPicPr>
-          <p:nvPr>
+          <p:cNvGraphicFramePr>
+            <a:graphicFrameLocks noGrp="1"/>
+          </p:cNvGraphicFramePr>
+          <p:nvPr>
+            <p:ph idx="1"/>
             <p:extLst>
-              <p:ext uri="{386F3935-93C4-4BCD-93E2-E3B085C9AB24}">
-                <p16:designElem xmlns:p16="http://schemas.microsoft.com/office/powerpoint/2015/main" val="1"/>
+              <p:ext uri="{D42A27DB-BD31-4B8C-83A1-F6EECF244321}">
+                <p14:modId xmlns:p14="http://schemas.microsoft.com/office/powerpoint/2010/main" val="1454619993"/>
               </p:ext>
             </p:extLst>
           </p:nvPr>
-        </p:nvPicPr>
-        <p:blipFill>
-          <a:blip r:embed="rId2">
-            <a:extLst>
-              <a:ext uri="{28A0092B-C50C-407E-A947-70E740481C1C}">
-                <a14:useLocalDpi xmlns:a14="http://schemas.microsoft.com/office/drawing/2010/main" val="0"/>
-              </a:ext>
-            </a:extLst>
-          </a:blip>
-          <a:stretch>
-            <a:fillRect/>
-          </a:stretch>
-        </p:blipFill>
-        <p:spPr>
-          <a:xfrm>
-            <a:off x="0" y="0"/>
-            <a:ext cx="12192000" cy="1441450"/>
-          </a:xfrm>
-          <a:prstGeom prst="rect">
-            <a:avLst/>
-          </a:prstGeom>
-        </p:spPr>
-      </p:pic>
-      <p:sp>
-        <p:nvSpPr>
-          <p:cNvPr id="2" name="Title 1">
+        </p:nvGraphicFramePr>
+        <p:xfrm>
+          <a:off x="698500" y="1252855"/>
+          <a:ext cx="10896600" cy="5605145"/>
+        </p:xfrm>
+        <a:graphic>
+          <a:graphicData uri="http://schemas.openxmlformats.org/drawingml/2006/table">
+            <a:tbl>
+              <a:tblPr firstRow="1" bandRow="1">
+                <a:tableStyleId>{5C22544A-7EE6-4342-B048-85BDC9FD1C3A}</a:tableStyleId>
+              </a:tblPr>
+              <a:tblGrid>
+                <a:gridCol w="3683000">
+                  <a:extLst>
+                    <a:ext uri="{9D8B030D-6E8A-4147-A177-3AD203B41FA5}">
+                      <a16:colId xmlns:a16="http://schemas.microsoft.com/office/drawing/2014/main" val="2759771916"/>
+                    </a:ext>
+                  </a:extLst>
+                </a:gridCol>
+                <a:gridCol w="3606800">
+                  <a:extLst>
+                    <a:ext uri="{9D8B030D-6E8A-4147-A177-3AD203B41FA5}">
+                      <a16:colId xmlns:a16="http://schemas.microsoft.com/office/drawing/2014/main" val="1234108808"/>
+                    </a:ext>
+                  </a:extLst>
+                </a:gridCol>
+                <a:gridCol w="3606800">
+                  <a:extLst>
+                    <a:ext uri="{9D8B030D-6E8A-4147-A177-3AD203B41FA5}">
+                      <a16:colId xmlns:a16="http://schemas.microsoft.com/office/drawing/2014/main" val="1337820626"/>
+                    </a:ext>
+                  </a:extLst>
+                </a:gridCol>
+              </a:tblGrid>
+              <a:tr h="393065">
+                <a:tc>
+                  <a:txBody>
+                    <a:bodyPr/>
+                    <a:lstStyle/>
+                    <a:p>
+                      <a:pPr fontAlgn="b"/>
+                      <a:r>
+                        <a:rPr lang="uk-UA" b="1" dirty="0">
+                          <a:effectLst/>
+                        </a:rPr>
+                        <a:t>Паттерн</a:t>
+                      </a:r>
+                    </a:p>
+                  </a:txBody>
+                  <a:tcPr anchor="b"/>
+                </a:tc>
+                <a:tc>
+                  <a:txBody>
+                    <a:bodyPr/>
+                    <a:lstStyle/>
+                    <a:p>
+                      <a:pPr fontAlgn="b"/>
+                      <a:r>
+                        <a:rPr lang="uk-UA" b="1" dirty="0">
+                          <a:effectLst/>
+                        </a:rPr>
+                        <a:t>Дозволяє</a:t>
+                      </a:r>
+                    </a:p>
+                  </a:txBody>
+                  <a:tcPr anchor="b"/>
+                </a:tc>
+                <a:tc>
+                  <a:txBody>
+                    <a:bodyPr/>
+                    <a:lstStyle/>
+                    <a:p>
+                      <a:pPr fontAlgn="b"/>
+                      <a:r>
+                        <a:rPr lang="uk-UA" b="1">
+                          <a:effectLst/>
+                        </a:rPr>
+                        <a:t>Використовується для</a:t>
+                      </a:r>
+                    </a:p>
+                  </a:txBody>
+                  <a:tcPr anchor="b"/>
+                </a:tc>
+                <a:extLst>
+                  <a:ext uri="{0D108BD9-81ED-4DB2-BD59-A6C34878D82A}">
+                    <a16:rowId xmlns:a16="http://schemas.microsoft.com/office/drawing/2014/main" val="1037275983"/>
+                  </a:ext>
+                </a:extLst>
+              </a:tr>
+              <a:tr h="370840">
+                <a:tc>
+                  <a:txBody>
+                    <a:bodyPr/>
+                    <a:lstStyle/>
+                    <a:p>
+                      <a:pPr fontAlgn="base"/>
+                      <a:r>
+                        <a:rPr lang="uk-UA">
+                          <a:effectLst/>
+                        </a:rPr>
+                        <a:t>Абстрактна фабрика</a:t>
+                      </a:r>
+                    </a:p>
+                  </a:txBody>
+                  <a:tcPr anchor="ctr"/>
+                </a:tc>
+                <a:tc>
+                  <a:txBody>
+                    <a:bodyPr/>
+                    <a:lstStyle/>
+                    <a:p>
+                      <a:pPr fontAlgn="base"/>
+                      <a:r>
+                        <a:rPr lang="ru-RU" dirty="0">
+                          <a:effectLst/>
+                        </a:rPr>
+                        <a:t>Дозволяє створювати сімейства пов'язаних об'єктів без прив'язки до конкретних класів.</a:t>
+                      </a:r>
+                    </a:p>
+                  </a:txBody>
+                  <a:tcPr anchor="ctr"/>
+                </a:tc>
+                <a:tc>
+                  <a:txBody>
+                    <a:bodyPr/>
+                    <a:lstStyle/>
+                    <a:p>
+                      <a:pPr fontAlgn="base"/>
+                      <a:r>
+                        <a:rPr lang="ru-RU">
+                          <a:effectLst/>
+                        </a:rPr>
+                        <a:t>Використовується, коли система повинна працювати зі сімейством об'єктів, які пов'язані або взаємозалежні.</a:t>
+                      </a:r>
+                    </a:p>
+                  </a:txBody>
+                  <a:tcPr anchor="ctr"/>
+                </a:tc>
+                <a:extLst>
+                  <a:ext uri="{0D108BD9-81ED-4DB2-BD59-A6C34878D82A}">
+                    <a16:rowId xmlns:a16="http://schemas.microsoft.com/office/drawing/2014/main" val="945598108"/>
+                  </a:ext>
+                </a:extLst>
+              </a:tr>
+              <a:tr h="370840">
+                <a:tc>
+                  <a:txBody>
+                    <a:bodyPr/>
+                    <a:lstStyle/>
+                    <a:p>
+                      <a:pPr fontAlgn="base"/>
+                      <a:r>
+                        <a:rPr lang="uk-UA">
+                          <a:effectLst/>
+                        </a:rPr>
+                        <a:t>Фабричний метод</a:t>
+                      </a:r>
+                    </a:p>
+                  </a:txBody>
+                  <a:tcPr anchor="ctr"/>
+                </a:tc>
+                <a:tc>
+                  <a:txBody>
+                    <a:bodyPr/>
+                    <a:lstStyle/>
+                    <a:p>
+                      <a:pPr fontAlgn="base"/>
+                      <a:r>
+                        <a:rPr lang="ru-RU" dirty="0">
+                          <a:effectLst/>
+                        </a:rPr>
+                        <a:t>Дозволяє відкладати створення об'єктів до підкласів.</a:t>
+                      </a:r>
+                    </a:p>
+                  </a:txBody>
+                  <a:tcPr anchor="ctr"/>
+                </a:tc>
+                <a:tc>
+                  <a:txBody>
+                    <a:bodyPr/>
+                    <a:lstStyle/>
+                    <a:p>
+                      <a:pPr fontAlgn="base"/>
+                      <a:r>
+                        <a:rPr lang="ru-RU">
+                          <a:effectLst/>
+                        </a:rPr>
+                        <a:t>Використовується, коли клас має визначити, який конкретний підклас використовувати для створення об'єктів, або коли класи підкласів можуть бути різними.</a:t>
+                      </a:r>
+                    </a:p>
+                  </a:txBody>
+                  <a:tcPr anchor="ctr"/>
+                </a:tc>
+                <a:extLst>
+                  <a:ext uri="{0D108BD9-81ED-4DB2-BD59-A6C34878D82A}">
+                    <a16:rowId xmlns:a16="http://schemas.microsoft.com/office/drawing/2014/main" val="3816622228"/>
+                  </a:ext>
+                </a:extLst>
+              </a:tr>
+              <a:tr h="370840">
+                <a:tc>
+                  <a:txBody>
+                    <a:bodyPr/>
+                    <a:lstStyle/>
+                    <a:p>
+                      <a:pPr fontAlgn="base"/>
+                      <a:r>
+                        <a:rPr lang="uk-UA" dirty="0">
+                          <a:effectLst/>
+                        </a:rPr>
+                        <a:t>Будівельник</a:t>
+                      </a:r>
+                    </a:p>
+                  </a:txBody>
+                  <a:tcPr anchor="ctr"/>
+                </a:tc>
+                <a:tc>
+                  <a:txBody>
+                    <a:bodyPr/>
+                    <a:lstStyle/>
+                    <a:p>
+                      <a:pPr fontAlgn="base"/>
+                      <a:r>
+                        <a:rPr lang="ru-RU" dirty="0">
+                          <a:effectLst/>
+                        </a:rPr>
+                        <a:t>Дозволяє складати складні об'єкти крок за кроком.</a:t>
+                      </a:r>
+                    </a:p>
+                  </a:txBody>
+                  <a:tcPr anchor="ctr"/>
+                </a:tc>
+                <a:tc>
+                  <a:txBody>
+                    <a:bodyPr/>
+                    <a:lstStyle/>
+                    <a:p>
+                      <a:pPr fontAlgn="base"/>
+                      <a:r>
+                        <a:rPr lang="uk-UA" dirty="0">
+                          <a:effectLst/>
+                        </a:rPr>
+                        <a:t>Використовується, коли процес створення об'єкта складається з кількох кроків, або коли потрібно створювати різні варіації об'єктів з одного набору компонентів.</a:t>
+                      </a:r>
+                    </a:p>
+                  </a:txBody>
+                  <a:tcPr anchor="ctr"/>
+                </a:tc>
+                <a:extLst>
+                  <a:ext uri="{0D108BD9-81ED-4DB2-BD59-A6C34878D82A}">
+                    <a16:rowId xmlns:a16="http://schemas.microsoft.com/office/drawing/2014/main" val="2202767603"/>
+                  </a:ext>
+                </a:extLst>
+              </a:tr>
+            </a:tbl>
+          </a:graphicData>
+        </a:graphic>
+      </p:graphicFrame>
+      <p:sp>
+        <p:nvSpPr>
+          <p:cNvPr id="3" name="Slide Number Placeholder 5">
             <a:extLst>
               <a:ext uri="{FF2B5EF4-FFF2-40B4-BE49-F238E27FC236}">
-                <a16:creationId xmlns:a16="http://schemas.microsoft.com/office/drawing/2014/main" id="{7999A0B1-59E0-06B8-AF0D-BE94499CFDDF}"/>
-              </a:ext>
-            </a:extLst>
-          </p:cNvPr>
-          <p:cNvSpPr>
-            <a:spLocks noGrp="1"/>
-          </p:cNvSpPr>
-          <p:nvPr>
-            <p:ph type="title"/>
-          </p:nvPr>
-        </p:nvSpPr>
-        <p:spPr>
-          <a:xfrm>
-            <a:off x="685799" y="1076680"/>
-            <a:ext cx="3977639" cy="1600200"/>
-          </a:xfrm>
-        </p:spPr>
-        <p:txBody>
-          <a:bodyPr anchor="b">
-            <a:normAutofit/>
-          </a:bodyPr>
-          <a:lstStyle/>
-          <a:p>
-            <a:pPr algn="l"/>
-            <a:r>
-              <a:rPr lang="uk-UA" sz="3200" dirty="0"/>
-              <a:t>Псевдокод для </a:t>
-            </a:r>
-            <a:r>
-              <a:rPr lang="en-US" sz="3200" dirty="0"/>
-              <a:t>abstract factory</a:t>
-            </a:r>
-          </a:p>
-        </p:txBody>
-      </p:sp>
-      <p:sp>
-        <p:nvSpPr>
-          <p:cNvPr id="3" name="Content Placeholder 2">
-            <a:extLst>
-              <a:ext uri="{FF2B5EF4-FFF2-40B4-BE49-F238E27FC236}">
-                <a16:creationId xmlns:a16="http://schemas.microsoft.com/office/drawing/2014/main" id="{C4B74DCB-97BE-B6D9-5926-723E65687CFE}"/>
-              </a:ext>
-            </a:extLst>
-          </p:cNvPr>
-          <p:cNvSpPr>
-            <a:spLocks noGrp="1"/>
-          </p:cNvSpPr>
-          <p:nvPr>
-            <p:ph idx="1"/>
-          </p:nvPr>
-        </p:nvSpPr>
-        <p:spPr>
-          <a:xfrm>
-            <a:off x="685798" y="2586515"/>
-            <a:ext cx="3977639" cy="3854112"/>
-          </a:xfrm>
-        </p:spPr>
-        <p:txBody>
-          <a:bodyPr>
-            <a:noAutofit/>
-          </a:bodyPr>
-          <a:lstStyle/>
-          <a:p>
-            <a:pPr marL="0" indent="0" algn="just">
-              <a:buNone/>
-            </a:pPr>
-            <a:r>
-              <a:rPr lang="uk-UA" sz="2000" dirty="0">
-                <a:latin typeface="Times New Roman" panose="02020603050405020304" pitchFamily="18" charset="0"/>
-                <a:cs typeface="Times New Roman" panose="02020603050405020304" pitchFamily="18" charset="0"/>
-              </a:rPr>
-              <a:t>Для приклада розглянемо задачу створення к</a:t>
-            </a:r>
-            <a:r>
-              <a:rPr lang="ru-RU" sz="2000" dirty="0">
-                <a:latin typeface="Times New Roman" panose="02020603050405020304" pitchFamily="18" charset="0"/>
-                <a:cs typeface="Times New Roman" panose="02020603050405020304" pitchFamily="18" charset="0"/>
-              </a:rPr>
-              <a:t>рос-платформові елементи інтерфейсу і стежить за тим, щоб вони відповідали обраній операційній системі.</a:t>
-            </a:r>
-            <a:br>
-              <a:rPr lang="en-US" sz="2000" dirty="0">
-                <a:latin typeface="Times New Roman" panose="02020603050405020304" pitchFamily="18" charset="0"/>
-                <a:cs typeface="Times New Roman" panose="02020603050405020304" pitchFamily="18" charset="0"/>
-              </a:rPr>
-            </a:br>
-            <a:br>
-              <a:rPr lang="en-US" sz="2000" dirty="0">
-                <a:latin typeface="Times New Roman" panose="02020603050405020304" pitchFamily="18" charset="0"/>
-                <a:cs typeface="Times New Roman" panose="02020603050405020304" pitchFamily="18" charset="0"/>
-              </a:rPr>
-            </a:br>
-            <a:r>
-              <a:rPr lang="uk-UA" sz="2000" dirty="0">
-                <a:latin typeface="Times New Roman" panose="02020603050405020304" pitchFamily="18" charset="0"/>
-                <a:cs typeface="Times New Roman" panose="02020603050405020304" pitchFamily="18" charset="0"/>
-              </a:rPr>
-              <a:t>Крос-платформова програма може відображати одні й ті самі елементи інтерфейсу по-різному, в залежності від обраної операційної системи. Важливо, щоб у такій програмі всі створювані елементи завжди відповідали поточній операційній системі. </a:t>
-            </a:r>
-            <a:endParaRPr lang="en-US" sz="2000" dirty="0">
-              <a:latin typeface="Times New Roman" panose="02020603050405020304" pitchFamily="18" charset="0"/>
-              <a:cs typeface="Times New Roman" panose="02020603050405020304" pitchFamily="18" charset="0"/>
-            </a:endParaRPr>
-          </a:p>
-        </p:txBody>
-      </p:sp>
-      <p:pic>
-        <p:nvPicPr>
-          <p:cNvPr id="6" name="Picture 5">
-            <a:extLst>
-              <a:ext uri="{FF2B5EF4-FFF2-40B4-BE49-F238E27FC236}">
-                <a16:creationId xmlns:a16="http://schemas.microsoft.com/office/drawing/2014/main" id="{1ED9277A-5446-95B3-F556-3498CE0694FB}"/>
-              </a:ext>
-            </a:extLst>
-          </p:cNvPr>
-          <p:cNvPicPr>
-            <a:picLocks noChangeAspect="1"/>
-          </p:cNvPicPr>
-          <p:nvPr/>
-        </p:nvPicPr>
-        <p:blipFill>
-          <a:blip r:embed="rId3"/>
-          <a:stretch>
-            <a:fillRect/>
-          </a:stretch>
-        </p:blipFill>
-        <p:spPr>
-          <a:xfrm>
-            <a:off x="4972699" y="1293683"/>
-            <a:ext cx="6533501" cy="4377444"/>
-          </a:xfrm>
-          <a:prstGeom prst="rect">
-            <a:avLst/>
-          </a:prstGeom>
-        </p:spPr>
-      </p:pic>
-      <p:sp>
-        <p:nvSpPr>
-          <p:cNvPr id="7" name="Slide Number Placeholder 5">
-            <a:extLst>
-              <a:ext uri="{FF2B5EF4-FFF2-40B4-BE49-F238E27FC236}">
-                <a16:creationId xmlns:a16="http://schemas.microsoft.com/office/drawing/2014/main" id="{20AE7993-FE98-EF2E-9335-423A3170AD20}"/>
+                <a16:creationId xmlns:a16="http://schemas.microsoft.com/office/drawing/2014/main" id="{E340C0E4-B395-AE76-A919-93C9906864C9}"/>
               </a:ext>
             </a:extLst>
           </p:cNvPr>
@@ -7376,7 +7432,7 @@
         </p:nvSpPr>
         <p:spPr>
           <a:xfrm>
-            <a:off x="8567691" y="6093626"/>
+            <a:off x="9304537" y="6274602"/>
             <a:ext cx="2743200" cy="365125"/>
           </a:xfrm>
           <a:prstGeom prst="rect">
@@ -7495,7 +7551,7 @@
     </p:spTree>
     <p:extLst>
       <p:ext uri="{BB962C8B-B14F-4D97-AF65-F5344CB8AC3E}">
-        <p14:creationId xmlns:p14="http://schemas.microsoft.com/office/powerpoint/2010/main" val="4158298069"/>
+        <p14:creationId xmlns:p14="http://schemas.microsoft.com/office/powerpoint/2010/main" val="3052533313"/>
       </p:ext>
     </p:extLst>
   </p:cSld>
@@ -7508,17 +7564,15 @@
 <file path=ppt/slides/slide6.xml><?xml version="1.0" encoding="utf-8"?>
 <p:sld xmlns:a="http://schemas.openxmlformats.org/drawingml/2006/main" xmlns:r="http://schemas.openxmlformats.org/officeDocument/2006/relationships" xmlns:p="http://schemas.openxmlformats.org/presentationml/2006/main">
   <p:cSld>
-    <p:bg>
-      <p:bgPr>
-        <a:solidFill>
-          <a:schemeClr val="bg1"/>
-        </a:solidFill>
-        <a:effectLst/>
-      </p:bgPr>
-    </p:bg>
     <p:spTree>
       <p:nvGrpSpPr>
-        <p:cNvPr id="1" name=""/>
+        <p:cNvPr id="1" name="">
+          <a:extLst>
+            <a:ext uri="{FF2B5EF4-FFF2-40B4-BE49-F238E27FC236}">
+              <a16:creationId xmlns:a16="http://schemas.microsoft.com/office/drawing/2014/main" id="{74B6B31C-564E-E8E3-45AC-FE1AB7515E05}"/>
+            </a:ext>
+          </a:extLst>
+        </p:cNvPr>
         <p:cNvGrpSpPr/>
         <p:nvPr/>
       </p:nvGrpSpPr>
@@ -7532,217 +7586,262 @@
       </p:grpSpPr>
       <p:sp>
         <p:nvSpPr>
-          <p:cNvPr id="12" name="Rectangle 11">
+          <p:cNvPr id="2" name="Title 1">
             <a:extLst>
               <a:ext uri="{FF2B5EF4-FFF2-40B4-BE49-F238E27FC236}">
-                <a16:creationId xmlns:a16="http://schemas.microsoft.com/office/drawing/2014/main" id="{5B015324-98EE-4370-8001-85C1278A18ED}"/>
-              </a:ext>
-              <a:ext uri="{C183D7F6-B498-43B3-948B-1728B52AA6E4}">
-                <adec:decorative xmlns:adec="http://schemas.microsoft.com/office/drawing/2017/decorative" val="1"/>
+                <a16:creationId xmlns:a16="http://schemas.microsoft.com/office/drawing/2014/main" id="{6C9146FA-A92D-DF06-07F0-15C13DD8E5C6}"/>
               </a:ext>
             </a:extLst>
           </p:cNvPr>
           <p:cNvSpPr>
-            <a:spLocks noGrp="1" noRot="1" noChangeAspect="1" noMove="1" noResize="1" noEditPoints="1" noAdjustHandles="1" noChangeArrowheads="1" noChangeShapeType="1" noTextEdit="1"/>
-          </p:cNvSpPr>
-          <p:nvPr>
-            <p:extLst>
-              <p:ext uri="{386F3935-93C4-4BCD-93E2-E3B085C9AB24}">
-                <p16:designElem xmlns:p16="http://schemas.microsoft.com/office/powerpoint/2015/main" val="1"/>
-              </p:ext>
-            </p:extLst>
-          </p:nvPr>
-        </p:nvSpPr>
-        <p:spPr>
-          <a:xfrm>
-            <a:off x="0" y="0"/>
-            <a:ext cx="12192000" cy="6858000"/>
-          </a:xfrm>
-          <a:prstGeom prst="rect">
-            <a:avLst/>
-          </a:prstGeom>
-          <a:solidFill>
-            <a:schemeClr val="bg1"/>
-          </a:solidFill>
-          <a:ln>
-            <a:noFill/>
-          </a:ln>
-        </p:spPr>
-        <p:style>
-          <a:lnRef idx="2">
-            <a:schemeClr val="accent1">
-              <a:shade val="50000"/>
-            </a:schemeClr>
-          </a:lnRef>
-          <a:fillRef idx="1">
-            <a:schemeClr val="accent1"/>
-          </a:fillRef>
-          <a:effectRef idx="0">
-            <a:schemeClr val="accent1"/>
-          </a:effectRef>
-          <a:fontRef idx="minor">
-            <a:schemeClr val="lt1"/>
-          </a:fontRef>
-        </p:style>
-        <p:txBody>
-          <a:bodyPr rtlCol="0" anchor="ctr"/>
+            <a:spLocks noGrp="1"/>
+          </p:cNvSpPr>
+          <p:nvPr>
+            <p:ph type="title"/>
+          </p:nvPr>
+        </p:nvSpPr>
+        <p:spPr/>
+        <p:txBody>
+          <a:bodyPr/>
           <a:lstStyle/>
           <a:p>
-            <a:pPr algn="ctr"/>
-            <a:endParaRPr lang="en-US"/>
-          </a:p>
-        </p:txBody>
-      </p:sp>
-      <p:pic>
-        <p:nvPicPr>
-          <p:cNvPr id="14" name="Picture 13">
+            <a:r>
+              <a:rPr lang="uk-UA" dirty="0"/>
+              <a:t>Порівняння</a:t>
+            </a:r>
+            <a:endParaRPr lang="en-US" dirty="0"/>
+          </a:p>
+        </p:txBody>
+      </p:sp>
+      <p:graphicFrame>
+        <p:nvGraphicFramePr>
+          <p:cNvPr id="5" name="Content Placeholder 4">
             <a:extLst>
               <a:ext uri="{FF2B5EF4-FFF2-40B4-BE49-F238E27FC236}">
-                <a16:creationId xmlns:a16="http://schemas.microsoft.com/office/drawing/2014/main" id="{14E49BFF-40A2-4616-8638-9CBE4EC1F6AA}"/>
-              </a:ext>
-              <a:ext uri="{C183D7F6-B498-43B3-948B-1728B52AA6E4}">
-                <adec:decorative xmlns:adec="http://schemas.microsoft.com/office/drawing/2017/decorative" val="1"/>
+                <a16:creationId xmlns:a16="http://schemas.microsoft.com/office/drawing/2014/main" id="{07EBD10D-6607-B249-180D-538801B30F80}"/>
               </a:ext>
             </a:extLst>
           </p:cNvPr>
-          <p:cNvPicPr>
-            <a:picLocks noGrp="1" noRot="1" noChangeAspect="1" noMove="1" noResize="1" noEditPoints="1" noAdjustHandles="1" noChangeArrowheads="1" noChangeShapeType="1" noCrop="1"/>
-          </p:cNvPicPr>
-          <p:nvPr>
+          <p:cNvGraphicFramePr>
+            <a:graphicFrameLocks noGrp="1"/>
+          </p:cNvGraphicFramePr>
+          <p:nvPr>
+            <p:ph idx="1"/>
             <p:extLst>
-              <p:ext uri="{386F3935-93C4-4BCD-93E2-E3B085C9AB24}">
-                <p16:designElem xmlns:p16="http://schemas.microsoft.com/office/powerpoint/2015/main" val="1"/>
+              <p:ext uri="{D42A27DB-BD31-4B8C-83A1-F6EECF244321}">
+                <p14:modId xmlns:p14="http://schemas.microsoft.com/office/powerpoint/2010/main" val="724741292"/>
               </p:ext>
             </p:extLst>
           </p:nvPr>
-        </p:nvPicPr>
-        <p:blipFill>
-          <a:blip r:embed="rId2">
-            <a:extLst>
-              <a:ext uri="{28A0092B-C50C-407E-A947-70E740481C1C}">
-                <a14:useLocalDpi xmlns:a14="http://schemas.microsoft.com/office/drawing/2010/main" val="0"/>
-              </a:ext>
-            </a:extLst>
-          </a:blip>
-          <a:stretch>
-            <a:fillRect/>
-          </a:stretch>
-        </p:blipFill>
-        <p:spPr>
-          <a:xfrm>
-            <a:off x="0" y="0"/>
-            <a:ext cx="12192000" cy="1441450"/>
-          </a:xfrm>
-          <a:prstGeom prst="rect">
-            <a:avLst/>
-          </a:prstGeom>
-        </p:spPr>
-      </p:pic>
-      <p:sp>
-        <p:nvSpPr>
-          <p:cNvPr id="2" name="Title 1">
+        </p:nvGraphicFramePr>
+        <p:xfrm>
+          <a:off x="762000" y="1968500"/>
+          <a:ext cx="10896600" cy="4142105"/>
+        </p:xfrm>
+        <a:graphic>
+          <a:graphicData uri="http://schemas.openxmlformats.org/drawingml/2006/table">
+            <a:tbl>
+              <a:tblPr firstRow="1" bandRow="1">
+                <a:tableStyleId>{5C22544A-7EE6-4342-B048-85BDC9FD1C3A}</a:tableStyleId>
+              </a:tblPr>
+              <a:tblGrid>
+                <a:gridCol w="3683000">
+                  <a:extLst>
+                    <a:ext uri="{9D8B030D-6E8A-4147-A177-3AD203B41FA5}">
+                      <a16:colId xmlns:a16="http://schemas.microsoft.com/office/drawing/2014/main" val="2759771916"/>
+                    </a:ext>
+                  </a:extLst>
+                </a:gridCol>
+                <a:gridCol w="3606800">
+                  <a:extLst>
+                    <a:ext uri="{9D8B030D-6E8A-4147-A177-3AD203B41FA5}">
+                      <a16:colId xmlns:a16="http://schemas.microsoft.com/office/drawing/2014/main" val="1234108808"/>
+                    </a:ext>
+                  </a:extLst>
+                </a:gridCol>
+                <a:gridCol w="3606800">
+                  <a:extLst>
+                    <a:ext uri="{9D8B030D-6E8A-4147-A177-3AD203B41FA5}">
+                      <a16:colId xmlns:a16="http://schemas.microsoft.com/office/drawing/2014/main" val="1337820626"/>
+                    </a:ext>
+                  </a:extLst>
+                </a:gridCol>
+              </a:tblGrid>
+              <a:tr h="393065">
+                <a:tc>
+                  <a:txBody>
+                    <a:bodyPr/>
+                    <a:lstStyle/>
+                    <a:p>
+                      <a:pPr fontAlgn="b"/>
+                      <a:r>
+                        <a:rPr lang="uk-UA" b="1" dirty="0">
+                          <a:effectLst/>
+                        </a:rPr>
+                        <a:t>Паттерн</a:t>
+                      </a:r>
+                    </a:p>
+                  </a:txBody>
+                  <a:tcPr anchor="b"/>
+                </a:tc>
+                <a:tc>
+                  <a:txBody>
+                    <a:bodyPr/>
+                    <a:lstStyle/>
+                    <a:p>
+                      <a:pPr fontAlgn="b"/>
+                      <a:r>
+                        <a:rPr lang="uk-UA" b="1">
+                          <a:effectLst/>
+                        </a:rPr>
+                        <a:t>Дозволяє</a:t>
+                      </a:r>
+                    </a:p>
+                  </a:txBody>
+                  <a:tcPr anchor="b"/>
+                </a:tc>
+                <a:tc>
+                  <a:txBody>
+                    <a:bodyPr/>
+                    <a:lstStyle/>
+                    <a:p>
+                      <a:pPr fontAlgn="b"/>
+                      <a:r>
+                        <a:rPr lang="uk-UA" b="1">
+                          <a:effectLst/>
+                        </a:rPr>
+                        <a:t>Використовується для</a:t>
+                      </a:r>
+                    </a:p>
+                  </a:txBody>
+                  <a:tcPr anchor="b"/>
+                </a:tc>
+                <a:extLst>
+                  <a:ext uri="{0D108BD9-81ED-4DB2-BD59-A6C34878D82A}">
+                    <a16:rowId xmlns:a16="http://schemas.microsoft.com/office/drawing/2014/main" val="1037275983"/>
+                  </a:ext>
+                </a:extLst>
+              </a:tr>
+              <a:tr h="370840">
+                <a:tc>
+                  <a:txBody>
+                    <a:bodyPr/>
+                    <a:lstStyle/>
+                    <a:p>
+                      <a:pPr fontAlgn="base"/>
+                      <a:r>
+                        <a:rPr lang="uk-UA">
+                          <a:effectLst/>
+                        </a:rPr>
+                        <a:t>Прототип</a:t>
+                      </a:r>
+                    </a:p>
+                  </a:txBody>
+                  <a:tcPr anchor="ctr"/>
+                </a:tc>
+                <a:tc>
+                  <a:txBody>
+                    <a:bodyPr/>
+                    <a:lstStyle/>
+                    <a:p>
+                      <a:pPr fontAlgn="base"/>
+                      <a:r>
+                        <a:rPr lang="ru-RU" dirty="0">
+                          <a:effectLst/>
+                        </a:rPr>
+                        <a:t>Дозволяє клонувати об'єкти, замість того, щоб створювати нові.</a:t>
+                      </a:r>
+                    </a:p>
+                  </a:txBody>
+                  <a:tcPr anchor="ctr"/>
+                </a:tc>
+                <a:tc>
+                  <a:txBody>
+                    <a:bodyPr/>
+                    <a:lstStyle/>
+                    <a:p>
+                      <a:pPr fontAlgn="base"/>
+                      <a:r>
+                        <a:rPr lang="ru-RU" dirty="0">
+                          <a:effectLst/>
+                        </a:rPr>
+                        <a:t>Використовується, коли процес створення об'єктів є важким або займає багато ресурсів, або коли потрібно створити новий об'єкт на основі існуючого з невеликими змінами.</a:t>
+                      </a:r>
+                    </a:p>
+                  </a:txBody>
+                  <a:tcPr anchor="ctr"/>
+                </a:tc>
+                <a:extLst>
+                  <a:ext uri="{0D108BD9-81ED-4DB2-BD59-A6C34878D82A}">
+                    <a16:rowId xmlns:a16="http://schemas.microsoft.com/office/drawing/2014/main" val="3755418077"/>
+                  </a:ext>
+                </a:extLst>
+              </a:tr>
+              <a:tr h="370840">
+                <a:tc>
+                  <a:txBody>
+                    <a:bodyPr/>
+                    <a:lstStyle/>
+                    <a:p>
+                      <a:pPr fontAlgn="base"/>
+                      <a:r>
+                        <a:rPr lang="uk-UA">
+                          <a:effectLst/>
+                        </a:rPr>
+                        <a:t>Одиночний</a:t>
+                      </a:r>
+                    </a:p>
+                  </a:txBody>
+                  <a:tcPr anchor="ctr"/>
+                </a:tc>
+                <a:tc>
+                  <a:txBody>
+                    <a:bodyPr/>
+                    <a:lstStyle/>
+                    <a:p>
+                      <a:pPr fontAlgn="base"/>
+                      <a:r>
+                        <a:rPr lang="ru-RU" dirty="0">
+                          <a:effectLst/>
+                        </a:rPr>
+                        <a:t>Гарантує, що в класі існує тільки один екземпляр, і надає глобальну точку доступу до цього екземпляра.</a:t>
+                      </a:r>
+                    </a:p>
+                  </a:txBody>
+                  <a:tcPr anchor="ctr"/>
+                </a:tc>
+                <a:tc>
+                  <a:txBody>
+                    <a:bodyPr/>
+                    <a:lstStyle/>
+                    <a:p>
+                      <a:pPr fontAlgn="base"/>
+                      <a:r>
+                        <a:rPr lang="ru-RU" dirty="0">
+                          <a:effectLst/>
+                        </a:rPr>
+                        <a:t>Використовується, коли в системі потрібно мати єдиний об'єкт певного класу та цей об'єкт повинен бути доступним з будь-якого місця.</a:t>
+                      </a:r>
+                    </a:p>
+                  </a:txBody>
+                  <a:tcPr anchor="ctr"/>
+                </a:tc>
+                <a:extLst>
+                  <a:ext uri="{0D108BD9-81ED-4DB2-BD59-A6C34878D82A}">
+                    <a16:rowId xmlns:a16="http://schemas.microsoft.com/office/drawing/2014/main" val="335347148"/>
+                  </a:ext>
+                </a:extLst>
+              </a:tr>
+            </a:tbl>
+          </a:graphicData>
+        </a:graphic>
+      </p:graphicFrame>
+      <p:sp>
+        <p:nvSpPr>
+          <p:cNvPr id="3" name="Slide Number Placeholder 5">
             <a:extLst>
               <a:ext uri="{FF2B5EF4-FFF2-40B4-BE49-F238E27FC236}">
-                <a16:creationId xmlns:a16="http://schemas.microsoft.com/office/drawing/2014/main" id="{E565C0EE-4A8F-4789-EE2B-7757B3C9A628}"/>
-              </a:ext>
-            </a:extLst>
-          </p:cNvPr>
-          <p:cNvSpPr>
-            <a:spLocks noGrp="1"/>
-          </p:cNvSpPr>
-          <p:nvPr>
-            <p:ph type="title"/>
-          </p:nvPr>
-        </p:nvSpPr>
-        <p:spPr>
-          <a:xfrm>
-            <a:off x="685799" y="764373"/>
-            <a:ext cx="3977639" cy="1600200"/>
-          </a:xfrm>
-        </p:spPr>
-        <p:txBody>
-          <a:bodyPr anchor="b">
-            <a:normAutofit/>
-          </a:bodyPr>
-          <a:lstStyle/>
-          <a:p>
-            <a:pPr algn="l"/>
-            <a:r>
-              <a:rPr lang="uk-UA" sz="3200" dirty="0"/>
-              <a:t>Псевдокод</a:t>
-            </a:r>
-            <a:endParaRPr lang="en-US" sz="3200" dirty="0"/>
-          </a:p>
-        </p:txBody>
-      </p:sp>
-      <p:sp>
-        <p:nvSpPr>
-          <p:cNvPr id="3" name="Content Placeholder 2">
-            <a:extLst>
-              <a:ext uri="{FF2B5EF4-FFF2-40B4-BE49-F238E27FC236}">
-                <a16:creationId xmlns:a16="http://schemas.microsoft.com/office/drawing/2014/main" id="{B36EB06F-2D0A-8248-D88E-4EE00395280B}"/>
-              </a:ext>
-            </a:extLst>
-          </p:cNvPr>
-          <p:cNvSpPr>
-            <a:spLocks noGrp="1"/>
-          </p:cNvSpPr>
-          <p:nvPr>
-            <p:ph idx="1"/>
-          </p:nvPr>
-        </p:nvSpPr>
-        <p:spPr>
-          <a:xfrm>
-            <a:off x="685800" y="2364573"/>
-            <a:ext cx="3977639" cy="3854112"/>
-          </a:xfrm>
-        </p:spPr>
-        <p:txBody>
-          <a:bodyPr>
-            <a:normAutofit/>
-          </a:bodyPr>
-          <a:lstStyle/>
-          <a:p>
-            <a:endParaRPr lang="en-US" sz="1600" dirty="0"/>
-          </a:p>
-        </p:txBody>
-      </p:sp>
-      <p:pic>
-        <p:nvPicPr>
-          <p:cNvPr id="7" name="Picture 6">
-            <a:extLst>
-              <a:ext uri="{FF2B5EF4-FFF2-40B4-BE49-F238E27FC236}">
-                <a16:creationId xmlns:a16="http://schemas.microsoft.com/office/drawing/2014/main" id="{03667E88-1D00-D537-C5C6-9A5591F684F7}"/>
-              </a:ext>
-            </a:extLst>
-          </p:cNvPr>
-          <p:cNvPicPr>
-            <a:picLocks noChangeAspect="1"/>
-          </p:cNvPicPr>
-          <p:nvPr/>
-        </p:nvPicPr>
-        <p:blipFill>
-          <a:blip r:embed="rId3"/>
-          <a:stretch>
-            <a:fillRect/>
-          </a:stretch>
-        </p:blipFill>
-        <p:spPr>
-          <a:xfrm>
-            <a:off x="5865728" y="746126"/>
-            <a:ext cx="4747443" cy="5472558"/>
-          </a:xfrm>
-          <a:prstGeom prst="rect">
-            <a:avLst/>
-          </a:prstGeom>
-        </p:spPr>
-      </p:pic>
-      <p:sp>
-        <p:nvSpPr>
-          <p:cNvPr id="16" name="Slide Number Placeholder 5">
-            <a:extLst>
-              <a:ext uri="{FF2B5EF4-FFF2-40B4-BE49-F238E27FC236}">
-                <a16:creationId xmlns:a16="http://schemas.microsoft.com/office/drawing/2014/main" id="{3AB8F18C-802A-6EE2-E53D-4E3E995A96E0}"/>
+                <a16:creationId xmlns:a16="http://schemas.microsoft.com/office/drawing/2014/main" id="{97A47C9B-6D06-A499-9CE9-3A16009D79CE}"/>
               </a:ext>
             </a:extLst>
           </p:cNvPr>
@@ -7872,7 +7971,7 @@
     </p:spTree>
     <p:extLst>
       <p:ext uri="{BB962C8B-B14F-4D97-AF65-F5344CB8AC3E}">
-        <p14:creationId xmlns:p14="http://schemas.microsoft.com/office/powerpoint/2010/main" val="3331187169"/>
+        <p14:creationId xmlns:p14="http://schemas.microsoft.com/office/powerpoint/2010/main" val="1903866028"/>
       </p:ext>
     </p:extLst>
   </p:cSld>
@@ -7909,7 +8008,7 @@
       </p:grpSpPr>
       <p:sp>
         <p:nvSpPr>
-          <p:cNvPr id="19" name="Rectangle 18">
+          <p:cNvPr id="11" name="Rectangle 10">
             <a:extLst>
               <a:ext uri="{FF2B5EF4-FFF2-40B4-BE49-F238E27FC236}">
                 <a16:creationId xmlns:a16="http://schemas.microsoft.com/office/drawing/2014/main" id="{5B015324-98EE-4370-8001-85C1278A18ED}"/>
@@ -7972,7 +8071,7 @@
       </p:sp>
       <p:pic>
         <p:nvPicPr>
-          <p:cNvPr id="21" name="Picture 20">
+          <p:cNvPr id="13" name="Picture 12">
             <a:extLst>
               <a:ext uri="{FF2B5EF4-FFF2-40B4-BE49-F238E27FC236}">
                 <a16:creationId xmlns:a16="http://schemas.microsoft.com/office/drawing/2014/main" id="{14E49BFF-40A2-4616-8638-9CBE4EC1F6AA}"/>
@@ -8020,7 +8119,7 @@
           <p:cNvPr id="2" name="Title 1">
             <a:extLst>
               <a:ext uri="{FF2B5EF4-FFF2-40B4-BE49-F238E27FC236}">
-                <a16:creationId xmlns:a16="http://schemas.microsoft.com/office/drawing/2014/main" id="{E565C0EE-4A8F-4789-EE2B-7757B3C9A628}"/>
+                <a16:creationId xmlns:a16="http://schemas.microsoft.com/office/drawing/2014/main" id="{7999A0B1-59E0-06B8-AF0D-BE94499CFDDF}"/>
               </a:ext>
             </a:extLst>
           </p:cNvPr>
@@ -8033,7 +8132,7 @@
         </p:nvSpPr>
         <p:spPr>
           <a:xfrm>
-            <a:off x="685799" y="764373"/>
+            <a:off x="685799" y="1076680"/>
             <a:ext cx="3977639" cy="1600200"/>
           </a:xfrm>
         </p:spPr>
@@ -8045,10 +8144,9 @@
           <a:p>
             <a:pPr algn="l"/>
             <a:r>
-              <a:rPr lang="uk-UA" sz="3200" dirty="0"/>
-              <a:t>Псевдокод</a:t>
-            </a:r>
-            <a:endParaRPr lang="en-US" sz="3200" dirty="0"/>
+              <a:rPr lang="en-US" sz="3200" dirty="0"/>
+              <a:t>abstract factory</a:t>
+            </a:r>
           </a:p>
         </p:txBody>
       </p:sp>
@@ -8057,7 +8155,7 @@
           <p:cNvPr id="3" name="Content Placeholder 2">
             <a:extLst>
               <a:ext uri="{FF2B5EF4-FFF2-40B4-BE49-F238E27FC236}">
-                <a16:creationId xmlns:a16="http://schemas.microsoft.com/office/drawing/2014/main" id="{B36EB06F-2D0A-8248-D88E-4EE00395280B}"/>
+                <a16:creationId xmlns:a16="http://schemas.microsoft.com/office/drawing/2014/main" id="{C4B74DCB-97BE-B6D9-5926-723E65687CFE}"/>
               </a:ext>
             </a:extLst>
           </p:cNvPr>
@@ -8070,26 +8168,65 @@
         </p:nvSpPr>
         <p:spPr>
           <a:xfrm>
-            <a:off x="685800" y="2364573"/>
+            <a:off x="685798" y="2586515"/>
             <a:ext cx="3977639" cy="3854112"/>
           </a:xfrm>
         </p:spPr>
         <p:txBody>
           <a:bodyPr>
-            <a:normAutofit/>
+            <a:noAutofit/>
           </a:bodyPr>
           <a:lstStyle/>
           <a:p>
-            <a:endParaRPr lang="en-US" sz="1600" dirty="0"/>
+            <a:pPr marL="0" indent="0" algn="just">
+              <a:buNone/>
+            </a:pPr>
+            <a:r>
+              <a:rPr lang="uk-UA" sz="2000" dirty="0">
+                <a:latin typeface="Times New Roman" panose="02020603050405020304" pitchFamily="18" charset="0"/>
+                <a:cs typeface="Times New Roman" panose="02020603050405020304" pitchFamily="18" charset="0"/>
+              </a:rPr>
+              <a:t>Для приклада розглянемо задачу створення к</a:t>
+            </a:r>
+            <a:r>
+              <a:rPr lang="ru-RU" sz="2000" dirty="0">
+                <a:latin typeface="Times New Roman" panose="02020603050405020304" pitchFamily="18" charset="0"/>
+                <a:cs typeface="Times New Roman" panose="02020603050405020304" pitchFamily="18" charset="0"/>
+              </a:rPr>
+              <a:t>рос-платформові елементи інтерфейсу і стежить за тим, щоб вони відповідали обраній операційній системі.</a:t>
+            </a:r>
+            <a:br>
+              <a:rPr lang="en-US" sz="2000" dirty="0">
+                <a:latin typeface="Times New Roman" panose="02020603050405020304" pitchFamily="18" charset="0"/>
+                <a:cs typeface="Times New Roman" panose="02020603050405020304" pitchFamily="18" charset="0"/>
+              </a:rPr>
+            </a:br>
+            <a:br>
+              <a:rPr lang="en-US" sz="2000" dirty="0">
+                <a:latin typeface="Times New Roman" panose="02020603050405020304" pitchFamily="18" charset="0"/>
+                <a:cs typeface="Times New Roman" panose="02020603050405020304" pitchFamily="18" charset="0"/>
+              </a:rPr>
+            </a:br>
+            <a:r>
+              <a:rPr lang="uk-UA" sz="2000" dirty="0">
+                <a:latin typeface="Times New Roman" panose="02020603050405020304" pitchFamily="18" charset="0"/>
+                <a:cs typeface="Times New Roman" panose="02020603050405020304" pitchFamily="18" charset="0"/>
+              </a:rPr>
+              <a:t>Крос-платформова програма може відображати одні й ті самі елементи інтерфейсу по-різному, в залежності від обраної операційної системи. Важливо, щоб у такій програмі всі створювані елементи завжди відповідали поточній операційній системі. </a:t>
+            </a:r>
+            <a:endParaRPr lang="en-US" sz="2000" dirty="0">
+              <a:latin typeface="Times New Roman" panose="02020603050405020304" pitchFamily="18" charset="0"/>
+              <a:cs typeface="Times New Roman" panose="02020603050405020304" pitchFamily="18" charset="0"/>
+            </a:endParaRPr>
           </a:p>
         </p:txBody>
       </p:sp>
       <p:pic>
         <p:nvPicPr>
-          <p:cNvPr id="6" name="Picture 5" descr="A computer screen shot of a program&#10;&#10;Description automatically generated">
+          <p:cNvPr id="6" name="Picture 5">
             <a:extLst>
               <a:ext uri="{FF2B5EF4-FFF2-40B4-BE49-F238E27FC236}">
-                <a16:creationId xmlns:a16="http://schemas.microsoft.com/office/drawing/2014/main" id="{CBADEB8F-8CA1-E44A-CF68-9DFDD2D3446F}"/>
+                <a16:creationId xmlns:a16="http://schemas.microsoft.com/office/drawing/2014/main" id="{1ED9277A-5446-95B3-F556-3498CE0694FB}"/>
               </a:ext>
             </a:extLst>
           </p:cNvPr>
@@ -8106,8 +8243,8 @@
         </p:blipFill>
         <p:spPr>
           <a:xfrm>
-            <a:off x="5893090" y="746126"/>
-            <a:ext cx="4692718" cy="5472558"/>
+            <a:off x="4972699" y="1293683"/>
+            <a:ext cx="6533501" cy="4377444"/>
           </a:xfrm>
           <a:prstGeom prst="rect">
             <a:avLst/>
@@ -8116,10 +8253,10 @@
       </p:pic>
       <p:sp>
         <p:nvSpPr>
-          <p:cNvPr id="8" name="Slide Number Placeholder 5">
+          <p:cNvPr id="7" name="Slide Number Placeholder 5">
             <a:extLst>
               <a:ext uri="{FF2B5EF4-FFF2-40B4-BE49-F238E27FC236}">
-                <a16:creationId xmlns:a16="http://schemas.microsoft.com/office/drawing/2014/main" id="{8BE37BEB-E7EE-CAAE-EB66-F685E03DC6F2}"/>
+                <a16:creationId xmlns:a16="http://schemas.microsoft.com/office/drawing/2014/main" id="{20AE7993-FE98-EF2E-9335-423A3170AD20}"/>
               </a:ext>
             </a:extLst>
           </p:cNvPr>
@@ -8249,7 +8386,7 @@
     </p:spTree>
     <p:extLst>
       <p:ext uri="{BB962C8B-B14F-4D97-AF65-F5344CB8AC3E}">
-        <p14:creationId xmlns:p14="http://schemas.microsoft.com/office/powerpoint/2010/main" val="1002810814"/>
+        <p14:creationId xmlns:p14="http://schemas.microsoft.com/office/powerpoint/2010/main" val="4158298069"/>
       </p:ext>
     </p:extLst>
   </p:cSld>
@@ -8286,7 +8423,7 @@
       </p:grpSpPr>
       <p:sp>
         <p:nvSpPr>
-          <p:cNvPr id="26" name="Rectangle 25">
+          <p:cNvPr id="12" name="Rectangle 11">
             <a:extLst>
               <a:ext uri="{FF2B5EF4-FFF2-40B4-BE49-F238E27FC236}">
                 <a16:creationId xmlns:a16="http://schemas.microsoft.com/office/drawing/2014/main" id="{5B015324-98EE-4370-8001-85C1278A18ED}"/>
@@ -8349,7 +8486,7 @@
       </p:sp>
       <p:pic>
         <p:nvPicPr>
-          <p:cNvPr id="28" name="Picture 27">
+          <p:cNvPr id="14" name="Picture 13">
             <a:extLst>
               <a:ext uri="{FF2B5EF4-FFF2-40B4-BE49-F238E27FC236}">
                 <a16:creationId xmlns:a16="http://schemas.microsoft.com/office/drawing/2014/main" id="{14E49BFF-40A2-4616-8638-9CBE4EC1F6AA}"/>
@@ -8423,7 +8560,7 @@
             <a:pPr algn="l"/>
             <a:r>
               <a:rPr lang="uk-UA" sz="3200" dirty="0"/>
-              <a:t>Псевдокод</a:t>
+              <a:t>Приклад використання</a:t>
             </a:r>
             <a:endParaRPr lang="en-US" sz="3200" dirty="0"/>
           </a:p>
@@ -8461,12 +8598,144 @@
           </a:p>
         </p:txBody>
       </p:sp>
+      <p:sp>
+        <p:nvSpPr>
+          <p:cNvPr id="16" name="Slide Number Placeholder 5">
+            <a:extLst>
+              <a:ext uri="{FF2B5EF4-FFF2-40B4-BE49-F238E27FC236}">
+                <a16:creationId xmlns:a16="http://schemas.microsoft.com/office/drawing/2014/main" id="{3AB8F18C-802A-6EE2-E53D-4E3E995A96E0}"/>
+              </a:ext>
+            </a:extLst>
+          </p:cNvPr>
+          <p:cNvSpPr txBox="1">
+            <a:spLocks/>
+          </p:cNvSpPr>
+          <p:nvPr/>
+        </p:nvSpPr>
+        <p:spPr>
+          <a:xfrm>
+            <a:off x="8567691" y="6093626"/>
+            <a:ext cx="2743200" cy="365125"/>
+          </a:xfrm>
+          <a:prstGeom prst="rect">
+            <a:avLst/>
+          </a:prstGeom>
+        </p:spPr>
+        <p:txBody>
+          <a:bodyPr vert="horz" lIns="91440" tIns="45720" rIns="91440" bIns="45720" rtlCol="0" anchor="ctr"/>
+          <a:lstStyle>
+            <a:defPPr>
+              <a:defRPr lang="en-US"/>
+            </a:defPPr>
+            <a:lvl1pPr marL="0" algn="r" defTabSz="457200" rtl="0" eaLnBrk="1" latinLnBrk="0" hangingPunct="1">
+              <a:defRPr sz="1050" kern="1200">
+                <a:solidFill>
+                  <a:schemeClr val="tx1">
+                    <a:tint val="75000"/>
+                  </a:schemeClr>
+                </a:solidFill>
+                <a:latin typeface="+mn-lt"/>
+                <a:ea typeface="+mn-ea"/>
+                <a:cs typeface="+mn-cs"/>
+              </a:defRPr>
+            </a:lvl1pPr>
+            <a:lvl2pPr marL="457200" algn="l" defTabSz="457200" rtl="0" eaLnBrk="1" latinLnBrk="0" hangingPunct="1">
+              <a:defRPr sz="1800" kern="1200">
+                <a:solidFill>
+                  <a:schemeClr val="tx1"/>
+                </a:solidFill>
+                <a:latin typeface="+mn-lt"/>
+                <a:ea typeface="+mn-ea"/>
+                <a:cs typeface="+mn-cs"/>
+              </a:defRPr>
+            </a:lvl2pPr>
+            <a:lvl3pPr marL="914400" algn="l" defTabSz="457200" rtl="0" eaLnBrk="1" latinLnBrk="0" hangingPunct="1">
+              <a:defRPr sz="1800" kern="1200">
+                <a:solidFill>
+                  <a:schemeClr val="tx1"/>
+                </a:solidFill>
+                <a:latin typeface="+mn-lt"/>
+                <a:ea typeface="+mn-ea"/>
+                <a:cs typeface="+mn-cs"/>
+              </a:defRPr>
+            </a:lvl3pPr>
+            <a:lvl4pPr marL="1371600" algn="l" defTabSz="457200" rtl="0" eaLnBrk="1" latinLnBrk="0" hangingPunct="1">
+              <a:defRPr sz="1800" kern="1200">
+                <a:solidFill>
+                  <a:schemeClr val="tx1"/>
+                </a:solidFill>
+                <a:latin typeface="+mn-lt"/>
+                <a:ea typeface="+mn-ea"/>
+                <a:cs typeface="+mn-cs"/>
+              </a:defRPr>
+            </a:lvl4pPr>
+            <a:lvl5pPr marL="1828800" algn="l" defTabSz="457200" rtl="0" eaLnBrk="1" latinLnBrk="0" hangingPunct="1">
+              <a:defRPr sz="1800" kern="1200">
+                <a:solidFill>
+                  <a:schemeClr val="tx1"/>
+                </a:solidFill>
+                <a:latin typeface="+mn-lt"/>
+                <a:ea typeface="+mn-ea"/>
+                <a:cs typeface="+mn-cs"/>
+              </a:defRPr>
+            </a:lvl5pPr>
+            <a:lvl6pPr marL="2286000" algn="l" defTabSz="457200" rtl="0" eaLnBrk="1" latinLnBrk="0" hangingPunct="1">
+              <a:defRPr sz="1800" kern="1200">
+                <a:solidFill>
+                  <a:schemeClr val="tx1"/>
+                </a:solidFill>
+                <a:latin typeface="+mn-lt"/>
+                <a:ea typeface="+mn-ea"/>
+                <a:cs typeface="+mn-cs"/>
+              </a:defRPr>
+            </a:lvl6pPr>
+            <a:lvl7pPr marL="2743200" algn="l" defTabSz="457200" rtl="0" eaLnBrk="1" latinLnBrk="0" hangingPunct="1">
+              <a:defRPr sz="1800" kern="1200">
+                <a:solidFill>
+                  <a:schemeClr val="tx1"/>
+                </a:solidFill>
+                <a:latin typeface="+mn-lt"/>
+                <a:ea typeface="+mn-ea"/>
+                <a:cs typeface="+mn-cs"/>
+              </a:defRPr>
+            </a:lvl7pPr>
+            <a:lvl8pPr marL="3200400" algn="l" defTabSz="457200" rtl="0" eaLnBrk="1" latinLnBrk="0" hangingPunct="1">
+              <a:defRPr sz="1800" kern="1200">
+                <a:solidFill>
+                  <a:schemeClr val="tx1"/>
+                </a:solidFill>
+                <a:latin typeface="+mn-lt"/>
+                <a:ea typeface="+mn-ea"/>
+                <a:cs typeface="+mn-cs"/>
+              </a:defRPr>
+            </a:lvl8pPr>
+            <a:lvl9pPr marL="3657600" algn="l" defTabSz="457200" rtl="0" eaLnBrk="1" latinLnBrk="0" hangingPunct="1">
+              <a:defRPr sz="1800" kern="1200">
+                <a:solidFill>
+                  <a:schemeClr val="tx1"/>
+                </a:solidFill>
+                <a:latin typeface="+mn-lt"/>
+                <a:ea typeface="+mn-ea"/>
+                <a:cs typeface="+mn-cs"/>
+              </a:defRPr>
+            </a:lvl9pPr>
+          </a:lstStyle>
+          <a:p>
+            <a:fld id="{B0A0C2A2-B7A5-4DDB-AACD-6FF09E7099BE}" type="slidenum">
+              <a:rPr lang="en-US" sz="1600" smtClean="0"/>
+              <a:pPr/>
+              <a:t>8</a:t>
+            </a:fld>
+            <a:endParaRPr lang="en-US" sz="1600" dirty="0"/>
+          </a:p>
+        </p:txBody>
+      </p:sp>
       <p:pic>
         <p:nvPicPr>
-          <p:cNvPr id="7" name="Picture 6">
+          <p:cNvPr id="5" name="Picture 4">
             <a:extLst>
               <a:ext uri="{FF2B5EF4-FFF2-40B4-BE49-F238E27FC236}">
-                <a16:creationId xmlns:a16="http://schemas.microsoft.com/office/drawing/2014/main" id="{261B20D8-0D4A-17B2-C242-B3F80A76F381}"/>
+                <a16:creationId xmlns:a16="http://schemas.microsoft.com/office/drawing/2014/main" id="{8E195645-044F-25A6-1859-A2FC6866DB87}"/>
               </a:ext>
             </a:extLst>
           </p:cNvPr>
@@ -8483,14 +8752,229 @@
         </p:blipFill>
         <p:spPr>
           <a:xfrm>
-            <a:off x="4972699" y="1791862"/>
-            <a:ext cx="6533501" cy="3381086"/>
+            <a:off x="6096000" y="519112"/>
+            <a:ext cx="5105400" cy="5819775"/>
           </a:xfrm>
           <a:prstGeom prst="rect">
             <a:avLst/>
           </a:prstGeom>
         </p:spPr>
       </p:pic>
+    </p:spTree>
+    <p:extLst>
+      <p:ext uri="{BB962C8B-B14F-4D97-AF65-F5344CB8AC3E}">
+        <p14:creationId xmlns:p14="http://schemas.microsoft.com/office/powerpoint/2010/main" val="3331187169"/>
+      </p:ext>
+    </p:extLst>
+  </p:cSld>
+  <p:clrMapOvr>
+    <a:masterClrMapping/>
+  </p:clrMapOvr>
+</p:sld>
+</file>
+
+<file path=ppt/slides/slide9.xml><?xml version="1.0" encoding="utf-8"?>
+<p:sld xmlns:a="http://schemas.openxmlformats.org/drawingml/2006/main" xmlns:r="http://schemas.openxmlformats.org/officeDocument/2006/relationships" xmlns:p="http://schemas.openxmlformats.org/presentationml/2006/main">
+  <p:cSld>
+    <p:bg>
+      <p:bgPr>
+        <a:solidFill>
+          <a:schemeClr val="bg1"/>
+        </a:solidFill>
+        <a:effectLst/>
+      </p:bgPr>
+    </p:bg>
+    <p:spTree>
+      <p:nvGrpSpPr>
+        <p:cNvPr id="1" name=""/>
+        <p:cNvGrpSpPr/>
+        <p:nvPr/>
+      </p:nvGrpSpPr>
+      <p:grpSpPr>
+        <a:xfrm>
+          <a:off x="0" y="0"/>
+          <a:ext cx="0" cy="0"/>
+          <a:chOff x="0" y="0"/>
+          <a:chExt cx="0" cy="0"/>
+        </a:xfrm>
+      </p:grpSpPr>
+      <p:sp>
+        <p:nvSpPr>
+          <p:cNvPr id="26" name="Rectangle 25">
+            <a:extLst>
+              <a:ext uri="{FF2B5EF4-FFF2-40B4-BE49-F238E27FC236}">
+                <a16:creationId xmlns:a16="http://schemas.microsoft.com/office/drawing/2014/main" id="{5B015324-98EE-4370-8001-85C1278A18ED}"/>
+              </a:ext>
+              <a:ext uri="{C183D7F6-B498-43B3-948B-1728B52AA6E4}">
+                <adec:decorative xmlns:adec="http://schemas.microsoft.com/office/drawing/2017/decorative" val="1"/>
+              </a:ext>
+            </a:extLst>
+          </p:cNvPr>
+          <p:cNvSpPr>
+            <a:spLocks noGrp="1" noRot="1" noChangeAspect="1" noMove="1" noResize="1" noEditPoints="1" noAdjustHandles="1" noChangeArrowheads="1" noChangeShapeType="1" noTextEdit="1"/>
+          </p:cNvSpPr>
+          <p:nvPr>
+            <p:extLst>
+              <p:ext uri="{386F3935-93C4-4BCD-93E2-E3B085C9AB24}">
+                <p16:designElem xmlns:p16="http://schemas.microsoft.com/office/powerpoint/2015/main" val="1"/>
+              </p:ext>
+            </p:extLst>
+          </p:nvPr>
+        </p:nvSpPr>
+        <p:spPr>
+          <a:xfrm>
+            <a:off x="0" y="0"/>
+            <a:ext cx="12192000" cy="6858000"/>
+          </a:xfrm>
+          <a:prstGeom prst="rect">
+            <a:avLst/>
+          </a:prstGeom>
+          <a:solidFill>
+            <a:schemeClr val="bg1"/>
+          </a:solidFill>
+          <a:ln>
+            <a:noFill/>
+          </a:ln>
+        </p:spPr>
+        <p:style>
+          <a:lnRef idx="2">
+            <a:schemeClr val="accent1">
+              <a:shade val="50000"/>
+            </a:schemeClr>
+          </a:lnRef>
+          <a:fillRef idx="1">
+            <a:schemeClr val="accent1"/>
+          </a:fillRef>
+          <a:effectRef idx="0">
+            <a:schemeClr val="accent1"/>
+          </a:effectRef>
+          <a:fontRef idx="minor">
+            <a:schemeClr val="lt1"/>
+          </a:fontRef>
+        </p:style>
+        <p:txBody>
+          <a:bodyPr rtlCol="0" anchor="ctr"/>
+          <a:lstStyle/>
+          <a:p>
+            <a:pPr algn="ctr"/>
+            <a:endParaRPr lang="en-US"/>
+          </a:p>
+        </p:txBody>
+      </p:sp>
+      <p:pic>
+        <p:nvPicPr>
+          <p:cNvPr id="28" name="Picture 27">
+            <a:extLst>
+              <a:ext uri="{FF2B5EF4-FFF2-40B4-BE49-F238E27FC236}">
+                <a16:creationId xmlns:a16="http://schemas.microsoft.com/office/drawing/2014/main" id="{14E49BFF-40A2-4616-8638-9CBE4EC1F6AA}"/>
+              </a:ext>
+              <a:ext uri="{C183D7F6-B498-43B3-948B-1728B52AA6E4}">
+                <adec:decorative xmlns:adec="http://schemas.microsoft.com/office/drawing/2017/decorative" val="1"/>
+              </a:ext>
+            </a:extLst>
+          </p:cNvPr>
+          <p:cNvPicPr>
+            <a:picLocks noGrp="1" noRot="1" noChangeAspect="1" noMove="1" noResize="1" noEditPoints="1" noAdjustHandles="1" noChangeArrowheads="1" noChangeShapeType="1" noCrop="1"/>
+          </p:cNvPicPr>
+          <p:nvPr>
+            <p:extLst>
+              <p:ext uri="{386F3935-93C4-4BCD-93E2-E3B085C9AB24}">
+                <p16:designElem xmlns:p16="http://schemas.microsoft.com/office/powerpoint/2015/main" val="1"/>
+              </p:ext>
+            </p:extLst>
+          </p:nvPr>
+        </p:nvPicPr>
+        <p:blipFill>
+          <a:blip r:embed="rId2">
+            <a:extLst>
+              <a:ext uri="{28A0092B-C50C-407E-A947-70E740481C1C}">
+                <a14:useLocalDpi xmlns:a14="http://schemas.microsoft.com/office/drawing/2010/main" val="0"/>
+              </a:ext>
+            </a:extLst>
+          </a:blip>
+          <a:stretch>
+            <a:fillRect/>
+          </a:stretch>
+        </p:blipFill>
+        <p:spPr>
+          <a:xfrm>
+            <a:off x="0" y="0"/>
+            <a:ext cx="12192000" cy="1441450"/>
+          </a:xfrm>
+          <a:prstGeom prst="rect">
+            <a:avLst/>
+          </a:prstGeom>
+        </p:spPr>
+      </p:pic>
+      <p:sp>
+        <p:nvSpPr>
+          <p:cNvPr id="2" name="Title 1">
+            <a:extLst>
+              <a:ext uri="{FF2B5EF4-FFF2-40B4-BE49-F238E27FC236}">
+                <a16:creationId xmlns:a16="http://schemas.microsoft.com/office/drawing/2014/main" id="{E565C0EE-4A8F-4789-EE2B-7757B3C9A628}"/>
+              </a:ext>
+            </a:extLst>
+          </p:cNvPr>
+          <p:cNvSpPr>
+            <a:spLocks noGrp="1"/>
+          </p:cNvSpPr>
+          <p:nvPr>
+            <p:ph type="title"/>
+          </p:nvPr>
+        </p:nvSpPr>
+        <p:spPr>
+          <a:xfrm>
+            <a:off x="685799" y="764373"/>
+            <a:ext cx="3977639" cy="1600200"/>
+          </a:xfrm>
+        </p:spPr>
+        <p:txBody>
+          <a:bodyPr anchor="b">
+            <a:normAutofit/>
+          </a:bodyPr>
+          <a:lstStyle/>
+          <a:p>
+            <a:pPr algn="l"/>
+            <a:r>
+              <a:rPr lang="uk-UA" sz="3200" dirty="0"/>
+              <a:t>Приклад використання</a:t>
+            </a:r>
+            <a:endParaRPr lang="en-US" sz="3200" dirty="0"/>
+          </a:p>
+        </p:txBody>
+      </p:sp>
+      <p:sp>
+        <p:nvSpPr>
+          <p:cNvPr id="3" name="Content Placeholder 2">
+            <a:extLst>
+              <a:ext uri="{FF2B5EF4-FFF2-40B4-BE49-F238E27FC236}">
+                <a16:creationId xmlns:a16="http://schemas.microsoft.com/office/drawing/2014/main" id="{B36EB06F-2D0A-8248-D88E-4EE00395280B}"/>
+              </a:ext>
+            </a:extLst>
+          </p:cNvPr>
+          <p:cNvSpPr>
+            <a:spLocks noGrp="1"/>
+          </p:cNvSpPr>
+          <p:nvPr>
+            <p:ph idx="1"/>
+          </p:nvPr>
+        </p:nvSpPr>
+        <p:spPr>
+          <a:xfrm>
+            <a:off x="685800" y="2364573"/>
+            <a:ext cx="3977639" cy="3854112"/>
+          </a:xfrm>
+        </p:spPr>
+        <p:txBody>
+          <a:bodyPr>
+            <a:normAutofit/>
+          </a:bodyPr>
+          <a:lstStyle/>
+          <a:p>
+            <a:endParaRPr lang="en-US" sz="1600" dirty="0"/>
+          </a:p>
+        </p:txBody>
+      </p:sp>
       <p:sp>
         <p:nvSpPr>
           <p:cNvPr id="8" name="Slide Number Placeholder 5">
@@ -8617,12 +9101,72 @@
             <a:fld id="{B0A0C2A2-B7A5-4DDB-AACD-6FF09E7099BE}" type="slidenum">
               <a:rPr lang="en-US" sz="1600" smtClean="0"/>
               <a:pPr/>
-              <a:t>8</a:t>
+              <a:t>9</a:t>
             </a:fld>
             <a:endParaRPr lang="en-US" sz="1600" dirty="0"/>
           </a:p>
         </p:txBody>
       </p:sp>
+      <p:pic>
+        <p:nvPicPr>
+          <p:cNvPr id="5" name="Picture 4">
+            <a:extLst>
+              <a:ext uri="{FF2B5EF4-FFF2-40B4-BE49-F238E27FC236}">
+                <a16:creationId xmlns:a16="http://schemas.microsoft.com/office/drawing/2014/main" id="{25D0E7B0-8AD6-E6C4-DE3A-538FD0534502}"/>
+              </a:ext>
+            </a:extLst>
+          </p:cNvPr>
+          <p:cNvPicPr>
+            <a:picLocks noChangeAspect="1"/>
+          </p:cNvPicPr>
+          <p:nvPr/>
+        </p:nvPicPr>
+        <p:blipFill>
+          <a:blip r:embed="rId3"/>
+          <a:stretch>
+            <a:fillRect/>
+          </a:stretch>
+        </p:blipFill>
+        <p:spPr>
+          <a:xfrm>
+            <a:off x="6334077" y="1197776"/>
+            <a:ext cx="4467225" cy="4895850"/>
+          </a:xfrm>
+          <a:prstGeom prst="rect">
+            <a:avLst/>
+          </a:prstGeom>
+        </p:spPr>
+      </p:pic>
+      <p:pic>
+        <p:nvPicPr>
+          <p:cNvPr id="9" name="Picture 8">
+            <a:extLst>
+              <a:ext uri="{FF2B5EF4-FFF2-40B4-BE49-F238E27FC236}">
+                <a16:creationId xmlns:a16="http://schemas.microsoft.com/office/drawing/2014/main" id="{7E7C35CB-4C9B-FB66-B3AE-1DDE21169E7C}"/>
+              </a:ext>
+            </a:extLst>
+          </p:cNvPr>
+          <p:cNvPicPr>
+            <a:picLocks noChangeAspect="1"/>
+          </p:cNvPicPr>
+          <p:nvPr/>
+        </p:nvPicPr>
+        <p:blipFill>
+          <a:blip r:embed="rId4"/>
+          <a:stretch>
+            <a:fillRect/>
+          </a:stretch>
+        </p:blipFill>
+        <p:spPr>
+          <a:xfrm>
+            <a:off x="115935" y="2329058"/>
+            <a:ext cx="4714733" cy="4129693"/>
+          </a:xfrm>
+          <a:prstGeom prst="rect">
+            <a:avLst/>
+          </a:prstGeom>
+        </p:spPr>
+      </p:pic>
     </p:spTree>
     <p:extLst>
       <p:ext uri="{BB962C8B-B14F-4D97-AF65-F5344CB8AC3E}">

</xml_diff>